<commit_message>
Neste commit estou colocando o inicio do meu projeto para conclusão do curso técnico de informática.
</commit_message>
<xml_diff>
--- a/Slide do projeto ficticio.pptx
+++ b/Slide do projeto ficticio.pptx
@@ -6,11 +6,11 @@
   </p:sldMasterIdLst>
   <p:sldIdLst>
     <p:sldId id="256" r:id="rId2"/>
-    <p:sldId id="257" r:id="rId3"/>
-    <p:sldId id="258" r:id="rId4"/>
+    <p:sldId id="258" r:id="rId3"/>
+    <p:sldId id="261" r:id="rId4"/>
     <p:sldId id="259" r:id="rId5"/>
     <p:sldId id="260" r:id="rId6"/>
-    <p:sldId id="261" r:id="rId7"/>
+    <p:sldId id="257" r:id="rId7"/>
     <p:sldId id="262" r:id="rId8"/>
     <p:sldId id="263" r:id="rId9"/>
     <p:sldId id="265" r:id="rId10"/>
@@ -112,6 +112,11 @@
       </a:defRPr>
     </a:lvl9pPr>
   </p:defaultTextStyle>
+  <p:extLst>
+    <p:ext uri="{EFAFB233-063F-42B5-8137-9DF3F51BA10A}">
+      <p15:sldGuideLst xmlns:p15="http://schemas.microsoft.com/office/powerpoint/2012/main"/>
+    </p:ext>
+  </p:extLst>
 </p:presentation>
 </file>
 
@@ -837,7 +842,7 @@
           <a:p>
             <a:fld id="{C15AD5AA-C4E7-4A6F-9F94-1721857FF3A2}" type="datetimeFigureOut">
               <a:rPr lang="pt-BR" smtClean="0"/>
-              <a:t>25/08/2016</a:t>
+              <a:t>01/09/2016</a:t>
             </a:fld>
             <a:endParaRPr lang="pt-BR"/>
           </a:p>
@@ -1088,7 +1093,7 @@
           <a:p>
             <a:fld id="{C15AD5AA-C4E7-4A6F-9F94-1721857FF3A2}" type="datetimeFigureOut">
               <a:rPr lang="pt-BR" smtClean="0"/>
-              <a:t>25/08/2016</a:t>
+              <a:t>01/09/2016</a:t>
             </a:fld>
             <a:endParaRPr lang="pt-BR"/>
           </a:p>
@@ -1402,7 +1407,7 @@
           <a:p>
             <a:fld id="{C15AD5AA-C4E7-4A6F-9F94-1721857FF3A2}" type="datetimeFigureOut">
               <a:rPr lang="pt-BR" smtClean="0"/>
-              <a:t>25/08/2016</a:t>
+              <a:t>01/09/2016</a:t>
             </a:fld>
             <a:endParaRPr lang="pt-BR"/>
           </a:p>
@@ -1743,7 +1748,7 @@
           <a:p>
             <a:fld id="{C15AD5AA-C4E7-4A6F-9F94-1721857FF3A2}" type="datetimeFigureOut">
               <a:rPr lang="pt-BR" smtClean="0"/>
-              <a:t>25/08/2016</a:t>
+              <a:t>01/09/2016</a:t>
             </a:fld>
             <a:endParaRPr lang="pt-BR"/>
           </a:p>
@@ -2057,7 +2062,7 @@
           <a:p>
             <a:fld id="{C15AD5AA-C4E7-4A6F-9F94-1721857FF3A2}" type="datetimeFigureOut">
               <a:rPr lang="pt-BR" smtClean="0"/>
-              <a:t>25/08/2016</a:t>
+              <a:t>01/09/2016</a:t>
             </a:fld>
             <a:endParaRPr lang="pt-BR"/>
           </a:p>
@@ -2450,7 +2455,7 @@
           <a:p>
             <a:fld id="{C15AD5AA-C4E7-4A6F-9F94-1721857FF3A2}" type="datetimeFigureOut">
               <a:rPr lang="pt-BR" smtClean="0"/>
-              <a:t>25/08/2016</a:t>
+              <a:t>01/09/2016</a:t>
             </a:fld>
             <a:endParaRPr lang="pt-BR"/>
           </a:p>
@@ -2620,7 +2625,7 @@
           <a:p>
             <a:fld id="{C15AD5AA-C4E7-4A6F-9F94-1721857FF3A2}" type="datetimeFigureOut">
               <a:rPr lang="pt-BR" smtClean="0"/>
-              <a:t>25/08/2016</a:t>
+              <a:t>01/09/2016</a:t>
             </a:fld>
             <a:endParaRPr lang="pt-BR"/>
           </a:p>
@@ -2800,7 +2805,7 @@
           <a:p>
             <a:fld id="{C15AD5AA-C4E7-4A6F-9F94-1721857FF3A2}" type="datetimeFigureOut">
               <a:rPr lang="pt-BR" smtClean="0"/>
-              <a:t>25/08/2016</a:t>
+              <a:t>01/09/2016</a:t>
             </a:fld>
             <a:endParaRPr lang="pt-BR"/>
           </a:p>
@@ -2976,7 +2981,7 @@
           <a:p>
             <a:fld id="{C15AD5AA-C4E7-4A6F-9F94-1721857FF3A2}" type="datetimeFigureOut">
               <a:rPr lang="pt-BR" smtClean="0"/>
-              <a:t>25/08/2016</a:t>
+              <a:t>01/09/2016</a:t>
             </a:fld>
             <a:endParaRPr lang="pt-BR"/>
           </a:p>
@@ -3223,7 +3228,7 @@
           <a:p>
             <a:fld id="{C15AD5AA-C4E7-4A6F-9F94-1721857FF3A2}" type="datetimeFigureOut">
               <a:rPr lang="pt-BR" smtClean="0"/>
-              <a:t>25/08/2016</a:t>
+              <a:t>01/09/2016</a:t>
             </a:fld>
             <a:endParaRPr lang="pt-BR"/>
           </a:p>
@@ -3455,7 +3460,7 @@
           <a:p>
             <a:fld id="{C15AD5AA-C4E7-4A6F-9F94-1721857FF3A2}" type="datetimeFigureOut">
               <a:rPr lang="pt-BR" smtClean="0"/>
-              <a:t>25/08/2016</a:t>
+              <a:t>01/09/2016</a:t>
             </a:fld>
             <a:endParaRPr lang="pt-BR"/>
           </a:p>
@@ -3829,7 +3834,7 @@
           <a:p>
             <a:fld id="{C15AD5AA-C4E7-4A6F-9F94-1721857FF3A2}" type="datetimeFigureOut">
               <a:rPr lang="pt-BR" smtClean="0"/>
-              <a:t>25/08/2016</a:t>
+              <a:t>01/09/2016</a:t>
             </a:fld>
             <a:endParaRPr lang="pt-BR"/>
           </a:p>
@@ -3952,7 +3957,7 @@
           <a:p>
             <a:fld id="{C15AD5AA-C4E7-4A6F-9F94-1721857FF3A2}" type="datetimeFigureOut">
               <a:rPr lang="pt-BR" smtClean="0"/>
-              <a:t>25/08/2016</a:t>
+              <a:t>01/09/2016</a:t>
             </a:fld>
             <a:endParaRPr lang="pt-BR"/>
           </a:p>
@@ -4047,7 +4052,7 @@
           <a:p>
             <a:fld id="{C15AD5AA-C4E7-4A6F-9F94-1721857FF3A2}" type="datetimeFigureOut">
               <a:rPr lang="pt-BR" smtClean="0"/>
-              <a:t>25/08/2016</a:t>
+              <a:t>01/09/2016</a:t>
             </a:fld>
             <a:endParaRPr lang="pt-BR"/>
           </a:p>
@@ -4302,7 +4307,7 @@
           <a:p>
             <a:fld id="{C15AD5AA-C4E7-4A6F-9F94-1721857FF3A2}" type="datetimeFigureOut">
               <a:rPr lang="pt-BR" smtClean="0"/>
-              <a:t>25/08/2016</a:t>
+              <a:t>01/09/2016</a:t>
             </a:fld>
             <a:endParaRPr lang="pt-BR"/>
           </a:p>
@@ -4565,7 +4570,7 @@
           <a:p>
             <a:fld id="{C15AD5AA-C4E7-4A6F-9F94-1721857FF3A2}" type="datetimeFigureOut">
               <a:rPr lang="pt-BR" smtClean="0"/>
-              <a:t>25/08/2016</a:t>
+              <a:t>01/09/2016</a:t>
             </a:fld>
             <a:endParaRPr lang="pt-BR"/>
           </a:p>
@@ -5308,7 +5313,7 @@
           <a:p>
             <a:fld id="{C15AD5AA-C4E7-4A6F-9F94-1721857FF3A2}" type="datetimeFigureOut">
               <a:rPr lang="pt-BR" smtClean="0"/>
-              <a:t>25/08/2016</a:t>
+              <a:t>01/09/2016</a:t>
             </a:fld>
             <a:endParaRPr lang="pt-BR"/>
           </a:p>
@@ -5886,7 +5891,15 @@
           <a:p>
             <a:r>
               <a:rPr lang="pt-BR" dirty="0" smtClean="0"/>
-              <a:t>Vinicius Alves Patrício </a:t>
+              <a:t>Vinicius Alves </a:t>
+            </a:r>
+            <a:r>
+              <a:rPr lang="pt-BR" dirty="0" err="1" smtClean="0"/>
+              <a:t>Patricio</a:t>
+            </a:r>
+            <a:r>
+              <a:rPr lang="pt-BR" dirty="0" smtClean="0"/>
+              <a:t> </a:t>
             </a:r>
           </a:p>
           <a:p>
@@ -5944,12 +5957,9 @@
           <a:lstStyle/>
           <a:p>
             <a:r>
-              <a:rPr lang="pt-BR" b="1" dirty="0"/>
-              <a:t>Objeto de Estudo    </a:t>
-            </a:r>
-            <a:br>
-              <a:rPr lang="pt-BR" b="1" dirty="0"/>
-            </a:br>
+              <a:rPr lang="pt-BR" dirty="0" smtClean="0"/>
+              <a:t>O problema </a:t>
+            </a:r>
             <a:endParaRPr lang="pt-BR" dirty="0"/>
           </a:p>
         </p:txBody>
@@ -5966,26 +5976,18 @@
         </p:nvSpPr>
         <p:spPr/>
         <p:txBody>
-          <a:bodyPr/>
-          <a:lstStyle/>
-          <a:p>
-            <a:pPr lvl="1"/>
-            <a:r>
-              <a:rPr lang="pt-BR" sz="2800" dirty="0" smtClean="0">
+          <a:bodyPr>
+            <a:normAutofit/>
+          </a:bodyPr>
+          <a:lstStyle/>
+          <a:p>
+            <a:pPr algn="just"/>
+            <a:r>
+              <a:rPr lang="pt-BR" sz="2000" dirty="0">
                 <a:latin typeface="Arial" panose="020B0604020202020204" pitchFamily="34" charset="0"/>
                 <a:cs typeface="Arial" panose="020B0604020202020204" pitchFamily="34" charset="0"/>
               </a:rPr>
-              <a:t>Computadores</a:t>
-            </a:r>
-          </a:p>
-          <a:p>
-            <a:pPr lvl="1" algn="just"/>
-            <a:r>
-              <a:rPr lang="pt-BR" sz="2400" dirty="0" smtClean="0">
-                <a:latin typeface="Arial" panose="020B0604020202020204" pitchFamily="34" charset="0"/>
-                <a:cs typeface="Arial" panose="020B0604020202020204" pitchFamily="34" charset="0"/>
-              </a:rPr>
-              <a:t>Recursos necessários para as aulas (Softwares)</a:t>
+              <a:t>Um curso de informática precisa ter computadores que funcionem e a partir do ponto em que estes mesmos fazem falta, a usabilidade do curso torna-se inferior ao que deveria ser. O projeto em questão providenciará alternativas para solucionar estes problemas . </a:t>
             </a:r>
           </a:p>
         </p:txBody>
@@ -5993,7 +5995,7 @@
     </p:spTree>
     <p:extLst>
       <p:ext uri="{BB962C8B-B14F-4D97-AF65-F5344CB8AC3E}">
-        <p14:creationId xmlns:p14="http://schemas.microsoft.com/office/powerpoint/2010/main" val="2528952604"/>
+        <p14:creationId xmlns:p14="http://schemas.microsoft.com/office/powerpoint/2010/main" val="443476802"/>
       </p:ext>
     </p:extLst>
   </p:cSld>
@@ -6036,10 +6038,9 @@
           <a:lstStyle/>
           <a:p>
             <a:r>
-              <a:rPr lang="pt-BR" dirty="0" smtClean="0"/>
-              <a:t>O problema </a:t>
-            </a:r>
-            <a:endParaRPr lang="pt-BR" dirty="0"/>
+              <a:rPr lang="pt-BR" dirty="0"/>
+              <a:t>Justificativa</a:t>
+            </a:r>
           </a:p>
         </p:txBody>
       </p:sp>
@@ -6062,12 +6063,11 @@
           <a:p>
             <a:pPr algn="just"/>
             <a:r>
-              <a:rPr lang="pt-BR" sz="2000" dirty="0">
-                <a:latin typeface="Arial" panose="020B0604020202020204" pitchFamily="34" charset="0"/>
-                <a:cs typeface="Arial" panose="020B0604020202020204" pitchFamily="34" charset="0"/>
-              </a:rPr>
-              <a:t>Um curso de informática precisa ter computadores que funcionem e a partir do ponto em que estes mesmos fazem falta, a usabilidade do curso torna-se inferior ao que deveria ser. O projeto em questão providenciará alternativas para solucionar estes problemas . </a:t>
-            </a:r>
+              <a:rPr lang="pt-BR" sz="2000" dirty="0"/>
+              <a:t>A ideia surgiu com o andamento prejudicado das aulas, onde a falta de computadores tendo a aparelhagem ou o sistema interno não funcionando como deveria . Para este problema em questão, a alternativa mais coerente foi a compra de novos computadores, pois com tudo novo, só precisará manter o bom uso do aparelho . </a:t>
+            </a:r>
+          </a:p>
+          <a:p>
             <a:endParaRPr lang="pt-BR" sz="2000" dirty="0">
               <a:latin typeface="Arial" panose="020B0604020202020204" pitchFamily="34" charset="0"/>
               <a:cs typeface="Arial" panose="020B0604020202020204" pitchFamily="34" charset="0"/>
@@ -6078,7 +6078,7 @@
     </p:spTree>
     <p:extLst>
       <p:ext uri="{BB962C8B-B14F-4D97-AF65-F5344CB8AC3E}">
-        <p14:creationId xmlns:p14="http://schemas.microsoft.com/office/powerpoint/2010/main" val="443476802"/>
+        <p14:creationId xmlns:p14="http://schemas.microsoft.com/office/powerpoint/2010/main" val="1416894419"/>
       </p:ext>
     </p:extLst>
   </p:cSld>
@@ -6124,7 +6124,6 @@
               <a:rPr lang="pt-BR" dirty="0"/>
               <a:t>Objetivo Geral</a:t>
             </a:r>
-            <a:endParaRPr lang="pt-BR" dirty="0"/>
           </a:p>
         </p:txBody>
       </p:sp>
@@ -6216,7 +6215,6 @@
               <a:rPr lang="pt-BR" dirty="0"/>
               <a:t>Objetivos Específicos</a:t>
             </a:r>
-            <a:endParaRPr lang="pt-BR" dirty="0"/>
           </a:p>
         </p:txBody>
       </p:sp>
@@ -6239,15 +6237,7 @@
           <a:p>
             <a:r>
               <a:rPr lang="pt-BR" sz="2000" dirty="0"/>
-              <a:t>Arrecadar fundos necessário para a compra dos novos computadores .</a:t>
-            </a:r>
-            <a:r>
-              <a:rPr lang="pt-BR" sz="2000" dirty="0"/>
-              <a:t> </a:t>
-            </a:r>
-            <a:r>
-              <a:rPr lang="pt-BR" sz="2000" dirty="0"/>
-              <a:t> </a:t>
+              <a:t>Arrecadar fundos necessário para a compra dos novos computadores .  </a:t>
             </a:r>
             <a:endParaRPr lang="pt-BR" sz="2000" dirty="0" smtClean="0"/>
           </a:p>
@@ -6318,9 +6308,12 @@
           <a:lstStyle/>
           <a:p>
             <a:r>
-              <a:rPr lang="pt-BR" dirty="0"/>
-              <a:t>Justificativa</a:t>
-            </a:r>
+              <a:rPr lang="pt-BR" b="1" dirty="0"/>
+              <a:t>Objeto de Estudo    </a:t>
+            </a:r>
+            <a:br>
+              <a:rPr lang="pt-BR" b="1" dirty="0"/>
+            </a:br>
             <a:endParaRPr lang="pt-BR" dirty="0"/>
           </a:p>
         </p:txBody>
@@ -6337,29 +6330,34 @@
         </p:nvSpPr>
         <p:spPr/>
         <p:txBody>
-          <a:bodyPr>
-            <a:normAutofit/>
-          </a:bodyPr>
-          <a:lstStyle/>
-          <a:p>
-            <a:pPr algn="just"/>
-            <a:r>
-              <a:rPr lang="pt-BR" sz="2000" dirty="0"/>
-              <a:t>A ideia surgiu com o andamento prejudicado das aulas, onde a falta de computadores tendo a aparelhagem ou o sistema interno não funcionando como deveria . Para este problema em questão, a alternativa mais coerente foi a compra de novos computadores, pois com tudo novo, só precisará manter o bom uso do aparelho . </a:t>
-            </a:r>
-          </a:p>
-          <a:p>
-            <a:endParaRPr lang="pt-BR" sz="2000" dirty="0">
-              <a:latin typeface="Arial" panose="020B0604020202020204" pitchFamily="34" charset="0"/>
-              <a:cs typeface="Arial" panose="020B0604020202020204" pitchFamily="34" charset="0"/>
-            </a:endParaRPr>
+          <a:bodyPr/>
+          <a:lstStyle/>
+          <a:p>
+            <a:pPr lvl="1"/>
+            <a:r>
+              <a:rPr lang="pt-BR" sz="2800" dirty="0" smtClean="0">
+                <a:latin typeface="Arial" panose="020B0604020202020204" pitchFamily="34" charset="0"/>
+                <a:cs typeface="Arial" panose="020B0604020202020204" pitchFamily="34" charset="0"/>
+              </a:rPr>
+              <a:t>Computadores</a:t>
+            </a:r>
+          </a:p>
+          <a:p>
+            <a:pPr lvl="1" algn="just"/>
+            <a:r>
+              <a:rPr lang="pt-BR" sz="2400" dirty="0" smtClean="0">
+                <a:latin typeface="Arial" panose="020B0604020202020204" pitchFamily="34" charset="0"/>
+                <a:cs typeface="Arial" panose="020B0604020202020204" pitchFamily="34" charset="0"/>
+              </a:rPr>
+              <a:t>Recursos necessários para as aulas (Softwares)</a:t>
+            </a:r>
           </a:p>
         </p:txBody>
       </p:sp>
     </p:spTree>
     <p:extLst>
       <p:ext uri="{BB962C8B-B14F-4D97-AF65-F5344CB8AC3E}">
-        <p14:creationId xmlns:p14="http://schemas.microsoft.com/office/powerpoint/2010/main" val="1416894419"/>
+        <p14:creationId xmlns:p14="http://schemas.microsoft.com/office/powerpoint/2010/main" val="2528952604"/>
       </p:ext>
     </p:extLst>
   </p:cSld>
@@ -6405,7 +6403,6 @@
               <a:rPr lang="pt-BR" dirty="0"/>
               <a:t>Metodologia</a:t>
             </a:r>
-            <a:endParaRPr lang="pt-BR" dirty="0"/>
           </a:p>
         </p:txBody>
       </p:sp>
@@ -6422,7 +6419,7 @@
         <p:spPr/>
         <p:txBody>
           <a:bodyPr>
-            <a:normAutofit fontScale="92500"/>
+            <a:normAutofit lnSpcReduction="10000"/>
           </a:bodyPr>
           <a:lstStyle/>
           <a:p>
@@ -6446,19 +6443,8 @@
                 <a:latin typeface="Arial" panose="020B0604020202020204" pitchFamily="34" charset="0"/>
                 <a:cs typeface="Arial" panose="020B0604020202020204" pitchFamily="34" charset="0"/>
               </a:rPr>
-              <a:t> J8, tendo objetivo de vender aproximadamente 600 rifas. Para isso será realizada a venda no centro e outros bairros de Criciúma .   Quem irá fazer as vendas. Alunos, professores ou qualquer </a:t>
-            </a:r>
-            <a:r>
-              <a:rPr lang="pt-BR" dirty="0" smtClean="0">
-                <a:latin typeface="Arial" panose="020B0604020202020204" pitchFamily="34" charset="0"/>
-                <a:cs typeface="Arial" panose="020B0604020202020204" pitchFamily="34" charset="0"/>
-              </a:rPr>
-              <a:t>pessoa.</a:t>
-            </a:r>
-            <a:endParaRPr lang="pt-BR" dirty="0">
-              <a:latin typeface="Arial" panose="020B0604020202020204" pitchFamily="34" charset="0"/>
-              <a:cs typeface="Arial" panose="020B0604020202020204" pitchFamily="34" charset="0"/>
-            </a:endParaRPr>
+              <a:t> J8, tendo objetivo de vender aproximadamente 600 rifas. Para isso será realizada a venda no centro e outros bairros de Criciúma </a:t>
+            </a:r>
           </a:p>
           <a:p>
             <a:r>
@@ -6566,13 +6552,8 @@
             </a:r>
             <a:r>
               <a:rPr lang="pt-BR" dirty="0"/>
-              <a:t> </a:t>
-            </a:r>
-            <a:r>
-              <a:rPr lang="pt-BR" dirty="0"/>
-              <a:t> </a:t>
-            </a:r>
-            <a:endParaRPr lang="pt-BR" dirty="0"/>
+              <a:t>  </a:t>
+            </a:r>
           </a:p>
         </p:txBody>
       </p:sp>

</xml_diff>